<commit_message>
added materials for CMR class 2.4
</commit_message>
<xml_diff>
--- a/2-2 -- GLMs/Morning/2-2 morning -- intro to linear models.pptx
+++ b/2-2 -- GLMs/Morning/2-2 morning -- intro to linear models.pptx
@@ -217,7 +217,7 @@
           <a:p>
             <a:fld id="{9FE5C67E-62E6-4AEE-BA68-61F0E64C9720}" type="datetimeFigureOut">
               <a:rPr lang="en-GB" smtClean="0"/>
-              <a:t>11/01/2016</a:t>
+              <a:t>12/01/2016</a:t>
             </a:fld>
             <a:endParaRPr lang="en-GB"/>
           </a:p>
@@ -754,7 +754,7 @@
             <a:fld id="{8DAF1337-8C05-406E-B008-3AFB78449C8D}" type="datetime1">
               <a:rPr lang="en-US" smtClean="0"/>
               <a:pPr/>
-              <a:t>1/11/2016</a:t>
+              <a:t>1/12/2016</a:t>
             </a:fld>
             <a:endParaRPr lang="en-US"/>
           </a:p>
@@ -934,7 +934,7 @@
             <a:fld id="{B76A168B-28A0-4631-BBE6-7C13443B745F}" type="datetime1">
               <a:rPr lang="en-US" smtClean="0"/>
               <a:pPr/>
-              <a:t>1/11/2016</a:t>
+              <a:t>1/12/2016</a:t>
             </a:fld>
             <a:endParaRPr lang="en-US"/>
           </a:p>
@@ -1120,7 +1120,7 @@
             <a:fld id="{01D2C63D-3F1A-4088-9983-107B90B42C1E}" type="datetime1">
               <a:rPr lang="en-US" smtClean="0"/>
               <a:pPr/>
-              <a:t>1/11/2016</a:t>
+              <a:t>1/12/2016</a:t>
             </a:fld>
             <a:endParaRPr lang="en-US"/>
           </a:p>
@@ -1847,7 +1847,7 @@
             <a:fld id="{5A8746E9-3C51-4C77-86DC-014C90BB210C}" type="datetime1">
               <a:rPr lang="en-US" smtClean="0"/>
               <a:pPr/>
-              <a:t>1/11/2016</a:t>
+              <a:t>1/12/2016</a:t>
             </a:fld>
             <a:endParaRPr lang="en-US"/>
           </a:p>
@@ -2157,7 +2157,7 @@
             <a:fld id="{AB020092-C857-4C8F-A3E0-7B7A9A182EA2}" type="datetime1">
               <a:rPr lang="en-US" smtClean="0"/>
               <a:pPr/>
-              <a:t>1/11/2016</a:t>
+              <a:t>1/12/2016</a:t>
             </a:fld>
             <a:endParaRPr lang="en-US"/>
           </a:p>
@@ -2324,7 +2324,7 @@
             <a:fld id="{C0D56CD5-240F-4B65-9CEA-A4BD872CEA9E}" type="datetime1">
               <a:rPr lang="en-US" smtClean="0"/>
               <a:pPr/>
-              <a:t>1/11/2016</a:t>
+              <a:t>1/12/2016</a:t>
             </a:fld>
             <a:endParaRPr lang="en-US"/>
           </a:p>
@@ -2425,7 +2425,7 @@
             <a:fld id="{84FFFBF0-247D-4137-B0CA-2961188BB56D}" type="datetime1">
               <a:rPr lang="en-US" smtClean="0"/>
               <a:pPr/>
-              <a:t>1/11/2016</a:t>
+              <a:t>1/12/2016</a:t>
             </a:fld>
             <a:endParaRPr lang="en-US"/>
           </a:p>
@@ -2708,7 +2708,7 @@
             <a:fld id="{39520545-5BD0-48CF-9C91-9734533D5CE5}" type="datetime1">
               <a:rPr lang="en-US" smtClean="0"/>
               <a:pPr/>
-              <a:t>1/11/2016</a:t>
+              <a:t>1/12/2016</a:t>
             </a:fld>
             <a:endParaRPr lang="en-US"/>
           </a:p>
@@ -2967,7 +2967,7 @@
             <a:fld id="{B2C36EED-1FD1-4564-A45D-ED19AD106396}" type="datetime1">
               <a:rPr lang="en-US" smtClean="0"/>
               <a:pPr/>
-              <a:t>1/11/2016</a:t>
+              <a:t>1/12/2016</a:t>
             </a:fld>
             <a:endParaRPr lang="en-US"/>
           </a:p>
@@ -3191,7 +3191,7 @@
             <a:fld id="{0DFC5BA1-3E8F-46E3-9E14-10F61BBEC1E2}" type="datetime1">
               <a:rPr lang="en-US" smtClean="0"/>
               <a:pPr/>
-              <a:t>1/11/2016</a:t>
+              <a:t>1/12/2016</a:t>
             </a:fld>
             <a:endParaRPr lang="en-US"/>
           </a:p>
@@ -3597,61 +3597,6 @@
           </a:p>
         </p:txBody>
       </p:sp>
-      <p:sp>
-        <p:nvSpPr>
-          <p:cNvPr id="3" name="Subtitle 2"/>
-          <p:cNvSpPr>
-            <a:spLocks noGrp="1"/>
-          </p:cNvSpPr>
-          <p:nvPr>
-            <p:ph type="subTitle" idx="1"/>
-          </p:nvPr>
-        </p:nvSpPr>
-        <p:spPr/>
-        <p:txBody>
-          <a:bodyPr>
-            <a:normAutofit lnSpcReduction="10000"/>
-          </a:bodyPr>
-          <a:lstStyle/>
-          <a:p>
-            <a:r>
-              <a:rPr lang="en-US" dirty="0" smtClean="0"/>
-              <a:t>Learning objectives</a:t>
-            </a:r>
-          </a:p>
-          <a:p>
-            <a:pPr marL="457200" indent="-457200">
-              <a:buFont typeface="+mj-lt"/>
-              <a:buAutoNum type="arabicPeriod"/>
-            </a:pPr>
-            <a:r>
-              <a:rPr lang="en-US" dirty="0" smtClean="0"/>
-              <a:t>Understand terminology for mixed-effect models</a:t>
-            </a:r>
-          </a:p>
-          <a:p>
-            <a:pPr marL="457200" indent="-457200">
-              <a:buFont typeface="+mj-lt"/>
-              <a:buAutoNum type="arabicPeriod"/>
-            </a:pPr>
-            <a:r>
-              <a:rPr lang="en-US" dirty="0" smtClean="0"/>
-              <a:t>Understand when random effects are appropriate</a:t>
-            </a:r>
-          </a:p>
-          <a:p>
-            <a:pPr marL="457200" indent="-457200">
-              <a:buFont typeface="+mj-lt"/>
-              <a:buAutoNum type="arabicPeriod"/>
-            </a:pPr>
-            <a:r>
-              <a:rPr lang="en-US" dirty="0" smtClean="0"/>
-              <a:t>Understand basic computational approach to mixed-effect models</a:t>
-            </a:r>
-            <a:endParaRPr lang="en-US" dirty="0"/>
-          </a:p>
-        </p:txBody>
-      </p:sp>
     </p:spTree>
     <p:extLst>
       <p:ext uri="{BB962C8B-B14F-4D97-AF65-F5344CB8AC3E}">
@@ -3708,8 +3653,8 @@
           </a:p>
         </p:txBody>
       </p:sp>
-      <mc:AlternateContent xmlns:mc="http://schemas.openxmlformats.org/markup-compatibility/2006">
-        <mc:Choice xmlns:a14="http://schemas.microsoft.com/office/drawing/2010/main" Requires="a14">
+      <mc:AlternateContent xmlns:mc="http://schemas.openxmlformats.org/markup-compatibility/2006" xmlns:a14="http://schemas.microsoft.com/office/drawing/2010/main">
+        <mc:Choice Requires="a14">
           <p:sp>
             <p:nvSpPr>
               <p:cNvPr id="3" name="Content Placeholder 2"/>
@@ -4703,7 +4648,7 @@
             </p:txBody>
           </p:sp>
         </mc:Choice>
-        <mc:Fallback>
+        <mc:Fallback xmlns="">
           <p:sp>
             <p:nvSpPr>
               <p:cNvPr id="3" name="Content Placeholder 2"/>
@@ -4747,11 +4692,11 @@
   <p:clrMapOvr>
     <a:masterClrMapping/>
   </p:clrMapOvr>
-  <mc:AlternateContent xmlns:mc="http://schemas.openxmlformats.org/markup-compatibility/2006">
-    <mc:Choice xmlns:p14="http://schemas.microsoft.com/office/powerpoint/2010/main" Requires="p14">
+  <mc:AlternateContent xmlns:mc="http://schemas.openxmlformats.org/markup-compatibility/2006" xmlns:p14="http://schemas.microsoft.com/office/powerpoint/2010/main">
+    <mc:Choice Requires="p14">
       <p:transition spd="slow" p14:dur="2000"/>
     </mc:Choice>
-    <mc:Fallback>
+    <mc:Fallback xmlns="">
       <p:transition spd="slow"/>
     </mc:Fallback>
   </mc:AlternateContent>
@@ -4801,8 +4746,8 @@
           </a:p>
         </p:txBody>
       </p:sp>
-      <mc:AlternateContent xmlns:mc="http://schemas.openxmlformats.org/markup-compatibility/2006">
-        <mc:Choice xmlns:a14="http://schemas.microsoft.com/office/drawing/2010/main" Requires="a14">
+      <mc:AlternateContent xmlns:mc="http://schemas.openxmlformats.org/markup-compatibility/2006" xmlns:a14="http://schemas.microsoft.com/office/drawing/2010/main">
+        <mc:Choice Requires="a14">
           <p:sp>
             <p:nvSpPr>
               <p:cNvPr id="3" name="Content Placeholder 2"/>
@@ -5348,7 +5293,7 @@
             </p:txBody>
           </p:sp>
         </mc:Choice>
-        <mc:Fallback>
+        <mc:Fallback xmlns="">
           <p:sp>
             <p:nvSpPr>
               <p:cNvPr id="3" name="Content Placeholder 2"/>
@@ -5392,11 +5337,11 @@
   <p:clrMapOvr>
     <a:masterClrMapping/>
   </p:clrMapOvr>
-  <mc:AlternateContent xmlns:mc="http://schemas.openxmlformats.org/markup-compatibility/2006">
-    <mc:Choice xmlns:p14="http://schemas.microsoft.com/office/powerpoint/2010/main" Requires="p14">
+  <mc:AlternateContent xmlns:mc="http://schemas.openxmlformats.org/markup-compatibility/2006" xmlns:p14="http://schemas.microsoft.com/office/powerpoint/2010/main">
+    <mc:Choice Requires="p14">
       <p:transition spd="slow" p14:dur="2000"/>
     </mc:Choice>
-    <mc:Fallback>
+    <mc:Fallback xmlns="">
       <p:transition spd="slow"/>
     </mc:Fallback>
   </mc:AlternateContent>
@@ -6014,11 +5959,11 @@
   <p:clrMapOvr>
     <a:masterClrMapping/>
   </p:clrMapOvr>
-  <mc:AlternateContent xmlns:mc="http://schemas.openxmlformats.org/markup-compatibility/2006">
-    <mc:Choice xmlns:p14="http://schemas.microsoft.com/office/powerpoint/2010/main" Requires="p14">
+  <mc:AlternateContent xmlns:mc="http://schemas.openxmlformats.org/markup-compatibility/2006" xmlns:p14="http://schemas.microsoft.com/office/powerpoint/2010/main">
+    <mc:Choice Requires="p14">
       <p:transition spd="slow" p14:dur="2000"/>
     </mc:Choice>
-    <mc:Fallback>
+    <mc:Fallback xmlns="">
       <p:transition spd="slow"/>
     </mc:Fallback>
   </mc:AlternateContent>
@@ -8649,15 +8594,7 @@
             <a:pPr lvl="2"/>
             <a:r>
               <a:rPr lang="en-US" sz="2000" dirty="0" smtClean="0"/>
-              <a:t>If </a:t>
-            </a:r>
-            <a:r>
-              <a:rPr lang="en-US" sz="2000" dirty="0" smtClean="0"/>
-              <a:t>it </a:t>
-            </a:r>
-            <a:r>
-              <a:rPr lang="en-US" sz="2000" dirty="0" smtClean="0"/>
-              <a:t>is 0 or 1, then its Bernoulli</a:t>
+              <a:t>If it is 0 or 1, then its Bernoulli</a:t>
             </a:r>
           </a:p>
           <a:p>
@@ -8686,6 +8623,13 @@
   <p:clrMapOvr>
     <a:masterClrMapping/>
   </p:clrMapOvr>
+  <p:timing>
+    <p:tnLst>
+      <p:par>
+        <p:cTn id="1" dur="indefinite" restart="never" nodeType="tmRoot"/>
+      </p:par>
+    </p:tnLst>
+  </p:timing>
 </p:sld>
 </file>
 
@@ -11788,6 +11732,13 @@
   <p:clrMapOvr>
     <a:masterClrMapping/>
   </p:clrMapOvr>
+  <p:timing>
+    <p:tnLst>
+      <p:par>
+        <p:cTn id="1" dur="indefinite" restart="never" nodeType="tmRoot"/>
+      </p:par>
+    </p:tnLst>
+  </p:timing>
 </p:sld>
 </file>
 
@@ -12160,6 +12111,13 @@
   <p:clrMapOvr>
     <a:masterClrMapping/>
   </p:clrMapOvr>
+  <p:timing>
+    <p:tnLst>
+      <p:par>
+        <p:cTn id="1" dur="indefinite" restart="never" nodeType="tmRoot"/>
+      </p:par>
+    </p:tnLst>
+  </p:timing>
 </p:sld>
 </file>
 
@@ -12199,8 +12157,8 @@
           </a:p>
         </p:txBody>
       </p:sp>
-      <mc:AlternateContent xmlns:mc="http://schemas.openxmlformats.org/markup-compatibility/2006">
-        <mc:Choice xmlns:a14="http://schemas.microsoft.com/office/drawing/2010/main" Requires="a14">
+      <mc:AlternateContent xmlns:mc="http://schemas.openxmlformats.org/markup-compatibility/2006" xmlns:a14="http://schemas.microsoft.com/office/drawing/2010/main">
+        <mc:Choice Requires="a14">
           <p:sp>
             <p:nvSpPr>
               <p:cNvPr id="3" name="Content Placeholder 2"/>
@@ -12469,7 +12427,7 @@
             </p:txBody>
           </p:sp>
         </mc:Choice>
-        <mc:Fallback>
+        <mc:Fallback xmlns="">
           <p:sp>
             <p:nvSpPr>
               <p:cNvPr id="3" name="Content Placeholder 2"/>
@@ -12849,6 +12807,13 @@
   <p:clrMapOvr>
     <a:masterClrMapping/>
   </p:clrMapOvr>
+  <p:timing>
+    <p:tnLst>
+      <p:par>
+        <p:cTn id="1" dur="indefinite" restart="never" nodeType="tmRoot"/>
+      </p:par>
+    </p:tnLst>
+  </p:timing>
 </p:sld>
 </file>
 
@@ -13282,8 +13247,8 @@
           </a:p>
         </p:txBody>
       </p:sp>
-      <mc:AlternateContent xmlns:mc="http://schemas.openxmlformats.org/markup-compatibility/2006">
-        <mc:Choice xmlns:a14="http://schemas.microsoft.com/office/drawing/2010/main" Requires="a14">
+      <mc:AlternateContent xmlns:mc="http://schemas.openxmlformats.org/markup-compatibility/2006" xmlns:a14="http://schemas.microsoft.com/office/drawing/2010/main">
+        <mc:Choice Requires="a14">
           <p:sp>
             <p:nvSpPr>
               <p:cNvPr id="3" name="Content Placeholder 2"/>
@@ -13725,7 +13690,7 @@
             </p:txBody>
           </p:sp>
         </mc:Choice>
-        <mc:Fallback>
+        <mc:Fallback xmlns="">
           <p:sp>
             <p:nvSpPr>
               <p:cNvPr id="3" name="Content Placeholder 2"/>
@@ -15350,8 +15315,8 @@
           </a:p>
         </p:txBody>
       </p:sp>
-      <mc:AlternateContent xmlns:mc="http://schemas.openxmlformats.org/markup-compatibility/2006">
-        <mc:Choice xmlns:a14="http://schemas.microsoft.com/office/drawing/2010/main" Requires="a14">
+      <mc:AlternateContent xmlns:mc="http://schemas.openxmlformats.org/markup-compatibility/2006" xmlns:a14="http://schemas.microsoft.com/office/drawing/2010/main">
+        <mc:Choice Requires="a14">
           <p:sp>
             <p:nvSpPr>
               <p:cNvPr id="3" name="Content Placeholder 2"/>
@@ -15651,7 +15616,7 @@
             </p:txBody>
           </p:sp>
         </mc:Choice>
-        <mc:Fallback>
+        <mc:Fallback xmlns="">
           <p:sp>
             <p:nvSpPr>
               <p:cNvPr id="3" name="Content Placeholder 2"/>
@@ -15695,11 +15660,11 @@
   <p:clrMapOvr>
     <a:masterClrMapping/>
   </p:clrMapOvr>
-  <mc:AlternateContent xmlns:mc="http://schemas.openxmlformats.org/markup-compatibility/2006">
-    <mc:Choice xmlns:p14="http://schemas.microsoft.com/office/powerpoint/2010/main" Requires="p14">
+  <mc:AlternateContent xmlns:mc="http://schemas.openxmlformats.org/markup-compatibility/2006" xmlns:p14="http://schemas.microsoft.com/office/powerpoint/2010/main">
+    <mc:Choice Requires="p14">
       <p:transition spd="slow" p14:dur="2000"/>
     </mc:Choice>
-    <mc:Fallback>
+    <mc:Fallback xmlns="">
       <p:transition spd="slow"/>
     </mc:Fallback>
   </mc:AlternateContent>

</xml_diff>